<commit_message>
Changes to some presentations
</commit_message>
<xml_diff>
--- a/docs/source/_images/CFAPyX_logo.pptx
+++ b/docs/source/_images/CFAPyX_logo.pptx
@@ -267,7 +267,7 @@
           <a:p>
             <a:fld id="{B234AADB-D2B6-514D-8AD4-392AA4F31166}" type="datetimeFigureOut">
               <a:rPr lang="en-US" smtClean="0"/>
-              <a:t>8/8/24</a:t>
+              <a:t>8/13/24</a:t>
             </a:fld>
             <a:endParaRPr lang="en-US"/>
           </a:p>
@@ -467,7 +467,7 @@
           <a:p>
             <a:fld id="{B234AADB-D2B6-514D-8AD4-392AA4F31166}" type="datetimeFigureOut">
               <a:rPr lang="en-US" smtClean="0"/>
-              <a:t>8/8/24</a:t>
+              <a:t>8/13/24</a:t>
             </a:fld>
             <a:endParaRPr lang="en-US"/>
           </a:p>
@@ -677,7 +677,7 @@
           <a:p>
             <a:fld id="{B234AADB-D2B6-514D-8AD4-392AA4F31166}" type="datetimeFigureOut">
               <a:rPr lang="en-US" smtClean="0"/>
-              <a:t>8/8/24</a:t>
+              <a:t>8/13/24</a:t>
             </a:fld>
             <a:endParaRPr lang="en-US"/>
           </a:p>
@@ -877,7 +877,7 @@
           <a:p>
             <a:fld id="{B234AADB-D2B6-514D-8AD4-392AA4F31166}" type="datetimeFigureOut">
               <a:rPr lang="en-US" smtClean="0"/>
-              <a:t>8/8/24</a:t>
+              <a:t>8/13/24</a:t>
             </a:fld>
             <a:endParaRPr lang="en-US"/>
           </a:p>
@@ -1153,7 +1153,7 @@
           <a:p>
             <a:fld id="{B234AADB-D2B6-514D-8AD4-392AA4F31166}" type="datetimeFigureOut">
               <a:rPr lang="en-US" smtClean="0"/>
-              <a:t>8/8/24</a:t>
+              <a:t>8/13/24</a:t>
             </a:fld>
             <a:endParaRPr lang="en-US"/>
           </a:p>
@@ -1421,7 +1421,7 @@
           <a:p>
             <a:fld id="{B234AADB-D2B6-514D-8AD4-392AA4F31166}" type="datetimeFigureOut">
               <a:rPr lang="en-US" smtClean="0"/>
-              <a:t>8/8/24</a:t>
+              <a:t>8/13/24</a:t>
             </a:fld>
             <a:endParaRPr lang="en-US"/>
           </a:p>
@@ -1836,7 +1836,7 @@
           <a:p>
             <a:fld id="{B234AADB-D2B6-514D-8AD4-392AA4F31166}" type="datetimeFigureOut">
               <a:rPr lang="en-US" smtClean="0"/>
-              <a:t>8/8/24</a:t>
+              <a:t>8/13/24</a:t>
             </a:fld>
             <a:endParaRPr lang="en-US"/>
           </a:p>
@@ -1978,7 +1978,7 @@
           <a:p>
             <a:fld id="{B234AADB-D2B6-514D-8AD4-392AA4F31166}" type="datetimeFigureOut">
               <a:rPr lang="en-US" smtClean="0"/>
-              <a:t>8/8/24</a:t>
+              <a:t>8/13/24</a:t>
             </a:fld>
             <a:endParaRPr lang="en-US"/>
           </a:p>
@@ -2091,7 +2091,7 @@
           <a:p>
             <a:fld id="{B234AADB-D2B6-514D-8AD4-392AA4F31166}" type="datetimeFigureOut">
               <a:rPr lang="en-US" smtClean="0"/>
-              <a:t>8/8/24</a:t>
+              <a:t>8/13/24</a:t>
             </a:fld>
             <a:endParaRPr lang="en-US"/>
           </a:p>
@@ -2404,7 +2404,7 @@
           <a:p>
             <a:fld id="{B234AADB-D2B6-514D-8AD4-392AA4F31166}" type="datetimeFigureOut">
               <a:rPr lang="en-US" smtClean="0"/>
-              <a:t>8/8/24</a:t>
+              <a:t>8/13/24</a:t>
             </a:fld>
             <a:endParaRPr lang="en-US"/>
           </a:p>
@@ -2693,7 +2693,7 @@
           <a:p>
             <a:fld id="{B234AADB-D2B6-514D-8AD4-392AA4F31166}" type="datetimeFigureOut">
               <a:rPr lang="en-US" smtClean="0"/>
-              <a:t>8/8/24</a:t>
+              <a:t>8/13/24</a:t>
             </a:fld>
             <a:endParaRPr lang="en-US"/>
           </a:p>
@@ -2936,7 +2936,7 @@
           <a:p>
             <a:fld id="{B234AADB-D2B6-514D-8AD4-392AA4F31166}" type="datetimeFigureOut">
               <a:rPr lang="en-US" smtClean="0"/>
-              <a:t>8/8/24</a:t>
+              <a:t>8/13/24</a:t>
             </a:fld>
             <a:endParaRPr lang="en-US"/>
           </a:p>
@@ -4361,7 +4361,7 @@
               <a:avLst/>
             </a:prstGeom>
             <a:solidFill>
-              <a:srgbClr val="55970E"/>
+              <a:srgbClr val="81B347"/>
             </a:solidFill>
             <a:ln w="38100">
               <a:solidFill>
@@ -4415,7 +4415,7 @@
               <a:avLst/>
             </a:prstGeom>
             <a:solidFill>
-              <a:srgbClr val="1186CB"/>
+              <a:srgbClr val="0062BB"/>
             </a:solidFill>
             <a:ln w="38100">
               <a:solidFill>

</xml_diff>